<commit_message>
Continued some more of my presentation slides
</commit_message>
<xml_diff>
--- a/Final Year Project/Architecture Application Presentation.pptx
+++ b/Final Year Project/Architecture Application Presentation.pptx
@@ -7,6 +7,9 @@
   <p:sldIdLst>
     <p:sldId id="256" r:id="rId2"/>
     <p:sldId id="257" r:id="rId3"/>
+    <p:sldId id="258" r:id="rId4"/>
+    <p:sldId id="259" r:id="rId5"/>
+    <p:sldId id="260" r:id="rId6"/>
   </p:sldIdLst>
   <p:sldSz cx="12192000" cy="6858000"/>
   <p:notesSz cx="6858000" cy="9144000"/>
@@ -105,6 +108,11 @@
       </a:defRPr>
     </a:lvl9pPr>
   </p:defaultTextStyle>
+  <p:extLst>
+    <p:ext uri="{EFAFB233-063F-42B5-8137-9DF3F51BA10A}">
+      <p15:sldGuideLst xmlns:p15="http://schemas.microsoft.com/office/powerpoint/2012/main"/>
+    </p:ext>
+  </p:extLst>
 </p:presentation>
 </file>
 
@@ -150,7 +158,7 @@
           </a:lstStyle>
           <a:p>
             <a:r>
-              <a:rPr lang="en-US" smtClean="0"/>
+              <a:rPr lang="en-US"/>
               <a:t>Click to edit Master title style</a:t>
             </a:r>
             <a:endParaRPr lang="en-GB"/>
@@ -215,7 +223,7 @@
           </a:lstStyle>
           <a:p>
             <a:r>
-              <a:rPr lang="en-US" smtClean="0"/>
+              <a:rPr lang="en-US"/>
               <a:t>Click to edit Master subtitle style</a:t>
             </a:r>
             <a:endParaRPr lang="en-GB"/>
@@ -239,7 +247,7 @@
           <a:p>
             <a:fld id="{8B606550-C541-449C-947B-29537B471591}" type="datetimeFigureOut">
               <a:rPr lang="en-GB" smtClean="0"/>
-              <a:t>02/03/2024</a:t>
+              <a:t>03/03/2024</a:t>
             </a:fld>
             <a:endParaRPr lang="en-GB"/>
           </a:p>
@@ -333,7 +341,7 @@
           <a:lstStyle/>
           <a:p>
             <a:r>
-              <a:rPr lang="en-US" smtClean="0"/>
+              <a:rPr lang="en-US"/>
               <a:t>Click to edit Master title style</a:t>
             </a:r>
             <a:endParaRPr lang="en-GB"/>
@@ -357,35 +365,35 @@
           <a:p>
             <a:pPr lvl="0"/>
             <a:r>
-              <a:rPr lang="en-US" smtClean="0"/>
+              <a:rPr lang="en-US"/>
               <a:t>Edit Master text styles</a:t>
             </a:r>
           </a:p>
           <a:p>
             <a:pPr lvl="1"/>
             <a:r>
-              <a:rPr lang="en-US" smtClean="0"/>
+              <a:rPr lang="en-US"/>
               <a:t>Second level</a:t>
             </a:r>
           </a:p>
           <a:p>
             <a:pPr lvl="2"/>
             <a:r>
-              <a:rPr lang="en-US" smtClean="0"/>
+              <a:rPr lang="en-US"/>
               <a:t>Third level</a:t>
             </a:r>
           </a:p>
           <a:p>
             <a:pPr lvl="3"/>
             <a:r>
-              <a:rPr lang="en-US" smtClean="0"/>
+              <a:rPr lang="en-US"/>
               <a:t>Fourth level</a:t>
             </a:r>
           </a:p>
           <a:p>
             <a:pPr lvl="4"/>
             <a:r>
-              <a:rPr lang="en-US" smtClean="0"/>
+              <a:rPr lang="en-US"/>
               <a:t>Fifth level</a:t>
             </a:r>
             <a:endParaRPr lang="en-GB"/>
@@ -409,7 +417,7 @@
           <a:p>
             <a:fld id="{8B606550-C541-449C-947B-29537B471591}" type="datetimeFigureOut">
               <a:rPr lang="en-GB" smtClean="0"/>
-              <a:t>02/03/2024</a:t>
+              <a:t>03/03/2024</a:t>
             </a:fld>
             <a:endParaRPr lang="en-GB"/>
           </a:p>
@@ -508,7 +516,7 @@
           <a:lstStyle/>
           <a:p>
             <a:r>
-              <a:rPr lang="en-US" smtClean="0"/>
+              <a:rPr lang="en-US"/>
               <a:t>Click to edit Master title style</a:t>
             </a:r>
             <a:endParaRPr lang="en-GB"/>
@@ -537,35 +545,35 @@
           <a:p>
             <a:pPr lvl="0"/>
             <a:r>
-              <a:rPr lang="en-US" smtClean="0"/>
+              <a:rPr lang="en-US"/>
               <a:t>Edit Master text styles</a:t>
             </a:r>
           </a:p>
           <a:p>
             <a:pPr lvl="1"/>
             <a:r>
-              <a:rPr lang="en-US" smtClean="0"/>
+              <a:rPr lang="en-US"/>
               <a:t>Second level</a:t>
             </a:r>
           </a:p>
           <a:p>
             <a:pPr lvl="2"/>
             <a:r>
-              <a:rPr lang="en-US" smtClean="0"/>
+              <a:rPr lang="en-US"/>
               <a:t>Third level</a:t>
             </a:r>
           </a:p>
           <a:p>
             <a:pPr lvl="3"/>
             <a:r>
-              <a:rPr lang="en-US" smtClean="0"/>
+              <a:rPr lang="en-US"/>
               <a:t>Fourth level</a:t>
             </a:r>
           </a:p>
           <a:p>
             <a:pPr lvl="4"/>
             <a:r>
-              <a:rPr lang="en-US" smtClean="0"/>
+              <a:rPr lang="en-US"/>
               <a:t>Fifth level</a:t>
             </a:r>
             <a:endParaRPr lang="en-GB"/>
@@ -589,7 +597,7 @@
           <a:p>
             <a:fld id="{8B606550-C541-449C-947B-29537B471591}" type="datetimeFigureOut">
               <a:rPr lang="en-GB" smtClean="0"/>
-              <a:t>02/03/2024</a:t>
+              <a:t>03/03/2024</a:t>
             </a:fld>
             <a:endParaRPr lang="en-GB"/>
           </a:p>
@@ -683,7 +691,7 @@
           <a:lstStyle/>
           <a:p>
             <a:r>
-              <a:rPr lang="en-US" smtClean="0"/>
+              <a:rPr lang="en-US"/>
               <a:t>Click to edit Master title style</a:t>
             </a:r>
             <a:endParaRPr lang="en-GB"/>
@@ -707,35 +715,35 @@
           <a:p>
             <a:pPr lvl="0"/>
             <a:r>
-              <a:rPr lang="en-US" smtClean="0"/>
+              <a:rPr lang="en-US"/>
               <a:t>Edit Master text styles</a:t>
             </a:r>
           </a:p>
           <a:p>
             <a:pPr lvl="1"/>
             <a:r>
-              <a:rPr lang="en-US" smtClean="0"/>
+              <a:rPr lang="en-US"/>
               <a:t>Second level</a:t>
             </a:r>
           </a:p>
           <a:p>
             <a:pPr lvl="2"/>
             <a:r>
-              <a:rPr lang="en-US" smtClean="0"/>
+              <a:rPr lang="en-US"/>
               <a:t>Third level</a:t>
             </a:r>
           </a:p>
           <a:p>
             <a:pPr lvl="3"/>
             <a:r>
-              <a:rPr lang="en-US" smtClean="0"/>
+              <a:rPr lang="en-US"/>
               <a:t>Fourth level</a:t>
             </a:r>
           </a:p>
           <a:p>
             <a:pPr lvl="4"/>
             <a:r>
-              <a:rPr lang="en-US" smtClean="0"/>
+              <a:rPr lang="en-US"/>
               <a:t>Fifth level</a:t>
             </a:r>
             <a:endParaRPr lang="en-GB"/>
@@ -759,7 +767,7 @@
           <a:p>
             <a:fld id="{8B606550-C541-449C-947B-29537B471591}" type="datetimeFigureOut">
               <a:rPr lang="en-GB" smtClean="0"/>
-              <a:t>02/03/2024</a:t>
+              <a:t>03/03/2024</a:t>
             </a:fld>
             <a:endParaRPr lang="en-GB"/>
           </a:p>
@@ -862,7 +870,7 @@
           </a:lstStyle>
           <a:p>
             <a:r>
-              <a:rPr lang="en-US" smtClean="0"/>
+              <a:rPr lang="en-US"/>
               <a:t>Click to edit Master title style</a:t>
             </a:r>
             <a:endParaRPr lang="en-GB"/>
@@ -982,7 +990,7 @@
           <a:p>
             <a:pPr lvl="0"/>
             <a:r>
-              <a:rPr lang="en-US" smtClean="0"/>
+              <a:rPr lang="en-US"/>
               <a:t>Edit Master text styles</a:t>
             </a:r>
           </a:p>
@@ -1005,7 +1013,7 @@
           <a:p>
             <a:fld id="{8B606550-C541-449C-947B-29537B471591}" type="datetimeFigureOut">
               <a:rPr lang="en-GB" smtClean="0"/>
-              <a:t>02/03/2024</a:t>
+              <a:t>03/03/2024</a:t>
             </a:fld>
             <a:endParaRPr lang="en-GB"/>
           </a:p>
@@ -1099,7 +1107,7 @@
           <a:lstStyle/>
           <a:p>
             <a:r>
-              <a:rPr lang="en-US" smtClean="0"/>
+              <a:rPr lang="en-US"/>
               <a:t>Click to edit Master title style</a:t>
             </a:r>
             <a:endParaRPr lang="en-GB"/>
@@ -1128,35 +1136,35 @@
           <a:p>
             <a:pPr lvl="0"/>
             <a:r>
-              <a:rPr lang="en-US" smtClean="0"/>
+              <a:rPr lang="en-US"/>
               <a:t>Edit Master text styles</a:t>
             </a:r>
           </a:p>
           <a:p>
             <a:pPr lvl="1"/>
             <a:r>
-              <a:rPr lang="en-US" smtClean="0"/>
+              <a:rPr lang="en-US"/>
               <a:t>Second level</a:t>
             </a:r>
           </a:p>
           <a:p>
             <a:pPr lvl="2"/>
             <a:r>
-              <a:rPr lang="en-US" smtClean="0"/>
+              <a:rPr lang="en-US"/>
               <a:t>Third level</a:t>
             </a:r>
           </a:p>
           <a:p>
             <a:pPr lvl="3"/>
             <a:r>
-              <a:rPr lang="en-US" smtClean="0"/>
+              <a:rPr lang="en-US"/>
               <a:t>Fourth level</a:t>
             </a:r>
           </a:p>
           <a:p>
             <a:pPr lvl="4"/>
             <a:r>
-              <a:rPr lang="en-US" smtClean="0"/>
+              <a:rPr lang="en-US"/>
               <a:t>Fifth level</a:t>
             </a:r>
             <a:endParaRPr lang="en-GB"/>
@@ -1185,35 +1193,35 @@
           <a:p>
             <a:pPr lvl="0"/>
             <a:r>
-              <a:rPr lang="en-US" smtClean="0"/>
+              <a:rPr lang="en-US"/>
               <a:t>Edit Master text styles</a:t>
             </a:r>
           </a:p>
           <a:p>
             <a:pPr lvl="1"/>
             <a:r>
-              <a:rPr lang="en-US" smtClean="0"/>
+              <a:rPr lang="en-US"/>
               <a:t>Second level</a:t>
             </a:r>
           </a:p>
           <a:p>
             <a:pPr lvl="2"/>
             <a:r>
-              <a:rPr lang="en-US" smtClean="0"/>
+              <a:rPr lang="en-US"/>
               <a:t>Third level</a:t>
             </a:r>
           </a:p>
           <a:p>
             <a:pPr lvl="3"/>
             <a:r>
-              <a:rPr lang="en-US" smtClean="0"/>
+              <a:rPr lang="en-US"/>
               <a:t>Fourth level</a:t>
             </a:r>
           </a:p>
           <a:p>
             <a:pPr lvl="4"/>
             <a:r>
-              <a:rPr lang="en-US" smtClean="0"/>
+              <a:rPr lang="en-US"/>
               <a:t>Fifth level</a:t>
             </a:r>
             <a:endParaRPr lang="en-GB"/>
@@ -1237,7 +1245,7 @@
           <a:p>
             <a:fld id="{8B606550-C541-449C-947B-29537B471591}" type="datetimeFigureOut">
               <a:rPr lang="en-GB" smtClean="0"/>
-              <a:t>02/03/2024</a:t>
+              <a:t>03/03/2024</a:t>
             </a:fld>
             <a:endParaRPr lang="en-GB"/>
           </a:p>
@@ -1336,7 +1344,7 @@
           <a:lstStyle/>
           <a:p>
             <a:r>
-              <a:rPr lang="en-US" smtClean="0"/>
+              <a:rPr lang="en-US"/>
               <a:t>Click to edit Master title style</a:t>
             </a:r>
             <a:endParaRPr lang="en-GB"/>
@@ -1402,7 +1410,7 @@
           <a:p>
             <a:pPr lvl="0"/>
             <a:r>
-              <a:rPr lang="en-US" smtClean="0"/>
+              <a:rPr lang="en-US"/>
               <a:t>Edit Master text styles</a:t>
             </a:r>
           </a:p>
@@ -1430,35 +1438,35 @@
           <a:p>
             <a:pPr lvl="0"/>
             <a:r>
-              <a:rPr lang="en-US" smtClean="0"/>
+              <a:rPr lang="en-US"/>
               <a:t>Edit Master text styles</a:t>
             </a:r>
           </a:p>
           <a:p>
             <a:pPr lvl="1"/>
             <a:r>
-              <a:rPr lang="en-US" smtClean="0"/>
+              <a:rPr lang="en-US"/>
               <a:t>Second level</a:t>
             </a:r>
           </a:p>
           <a:p>
             <a:pPr lvl="2"/>
             <a:r>
-              <a:rPr lang="en-US" smtClean="0"/>
+              <a:rPr lang="en-US"/>
               <a:t>Third level</a:t>
             </a:r>
           </a:p>
           <a:p>
             <a:pPr lvl="3"/>
             <a:r>
-              <a:rPr lang="en-US" smtClean="0"/>
+              <a:rPr lang="en-US"/>
               <a:t>Fourth level</a:t>
             </a:r>
           </a:p>
           <a:p>
             <a:pPr lvl="4"/>
             <a:r>
-              <a:rPr lang="en-US" smtClean="0"/>
+              <a:rPr lang="en-US"/>
               <a:t>Fifth level</a:t>
             </a:r>
             <a:endParaRPr lang="en-GB"/>
@@ -1524,7 +1532,7 @@
           <a:p>
             <a:pPr lvl="0"/>
             <a:r>
-              <a:rPr lang="en-US" smtClean="0"/>
+              <a:rPr lang="en-US"/>
               <a:t>Edit Master text styles</a:t>
             </a:r>
           </a:p>
@@ -1552,35 +1560,35 @@
           <a:p>
             <a:pPr lvl="0"/>
             <a:r>
-              <a:rPr lang="en-US" smtClean="0"/>
+              <a:rPr lang="en-US"/>
               <a:t>Edit Master text styles</a:t>
             </a:r>
           </a:p>
           <a:p>
             <a:pPr lvl="1"/>
             <a:r>
-              <a:rPr lang="en-US" smtClean="0"/>
+              <a:rPr lang="en-US"/>
               <a:t>Second level</a:t>
             </a:r>
           </a:p>
           <a:p>
             <a:pPr lvl="2"/>
             <a:r>
-              <a:rPr lang="en-US" smtClean="0"/>
+              <a:rPr lang="en-US"/>
               <a:t>Third level</a:t>
             </a:r>
           </a:p>
           <a:p>
             <a:pPr lvl="3"/>
             <a:r>
-              <a:rPr lang="en-US" smtClean="0"/>
+              <a:rPr lang="en-US"/>
               <a:t>Fourth level</a:t>
             </a:r>
           </a:p>
           <a:p>
             <a:pPr lvl="4"/>
             <a:r>
-              <a:rPr lang="en-US" smtClean="0"/>
+              <a:rPr lang="en-US"/>
               <a:t>Fifth level</a:t>
             </a:r>
             <a:endParaRPr lang="en-GB"/>
@@ -1604,7 +1612,7 @@
           <a:p>
             <a:fld id="{8B606550-C541-449C-947B-29537B471591}" type="datetimeFigureOut">
               <a:rPr lang="en-GB" smtClean="0"/>
-              <a:t>02/03/2024</a:t>
+              <a:t>03/03/2024</a:t>
             </a:fld>
             <a:endParaRPr lang="en-GB"/>
           </a:p>
@@ -1698,7 +1706,7 @@
           <a:lstStyle/>
           <a:p>
             <a:r>
-              <a:rPr lang="en-US" smtClean="0"/>
+              <a:rPr lang="en-US"/>
               <a:t>Click to edit Master title style</a:t>
             </a:r>
             <a:endParaRPr lang="en-GB"/>
@@ -1722,7 +1730,7 @@
           <a:p>
             <a:fld id="{8B606550-C541-449C-947B-29537B471591}" type="datetimeFigureOut">
               <a:rPr lang="en-GB" smtClean="0"/>
-              <a:t>02/03/2024</a:t>
+              <a:t>03/03/2024</a:t>
             </a:fld>
             <a:endParaRPr lang="en-GB"/>
           </a:p>
@@ -1817,7 +1825,7 @@
           <a:p>
             <a:fld id="{8B606550-C541-449C-947B-29537B471591}" type="datetimeFigureOut">
               <a:rPr lang="en-GB" smtClean="0"/>
-              <a:t>02/03/2024</a:t>
+              <a:t>03/03/2024</a:t>
             </a:fld>
             <a:endParaRPr lang="en-GB"/>
           </a:p>
@@ -1920,7 +1928,7 @@
           </a:lstStyle>
           <a:p>
             <a:r>
-              <a:rPr lang="en-US" smtClean="0"/>
+              <a:rPr lang="en-US"/>
               <a:t>Click to edit Master title style</a:t>
             </a:r>
             <a:endParaRPr lang="en-GB"/>
@@ -1977,35 +1985,35 @@
           <a:p>
             <a:pPr lvl="0"/>
             <a:r>
-              <a:rPr lang="en-US" smtClean="0"/>
+              <a:rPr lang="en-US"/>
               <a:t>Edit Master text styles</a:t>
             </a:r>
           </a:p>
           <a:p>
             <a:pPr lvl="1"/>
             <a:r>
-              <a:rPr lang="en-US" smtClean="0"/>
+              <a:rPr lang="en-US"/>
               <a:t>Second level</a:t>
             </a:r>
           </a:p>
           <a:p>
             <a:pPr lvl="2"/>
             <a:r>
-              <a:rPr lang="en-US" smtClean="0"/>
+              <a:rPr lang="en-US"/>
               <a:t>Third level</a:t>
             </a:r>
           </a:p>
           <a:p>
             <a:pPr lvl="3"/>
             <a:r>
-              <a:rPr lang="en-US" smtClean="0"/>
+              <a:rPr lang="en-US"/>
               <a:t>Fourth level</a:t>
             </a:r>
           </a:p>
           <a:p>
             <a:pPr lvl="4"/>
             <a:r>
-              <a:rPr lang="en-US" smtClean="0"/>
+              <a:rPr lang="en-US"/>
               <a:t>Fifth level</a:t>
             </a:r>
             <a:endParaRPr lang="en-GB"/>
@@ -2071,7 +2079,7 @@
           <a:p>
             <a:pPr lvl="0"/>
             <a:r>
-              <a:rPr lang="en-US" smtClean="0"/>
+              <a:rPr lang="en-US"/>
               <a:t>Edit Master text styles</a:t>
             </a:r>
           </a:p>
@@ -2094,7 +2102,7 @@
           <a:p>
             <a:fld id="{8B606550-C541-449C-947B-29537B471591}" type="datetimeFigureOut">
               <a:rPr lang="en-GB" smtClean="0"/>
-              <a:t>02/03/2024</a:t>
+              <a:t>03/03/2024</a:t>
             </a:fld>
             <a:endParaRPr lang="en-GB"/>
           </a:p>
@@ -2197,7 +2205,7 @@
           </a:lstStyle>
           <a:p>
             <a:r>
-              <a:rPr lang="en-US" smtClean="0"/>
+              <a:rPr lang="en-US"/>
               <a:t>Click to edit Master title style</a:t>
             </a:r>
             <a:endParaRPr lang="en-GB"/>
@@ -2324,7 +2332,7 @@
           <a:p>
             <a:pPr lvl="0"/>
             <a:r>
-              <a:rPr lang="en-US" smtClean="0"/>
+              <a:rPr lang="en-US"/>
               <a:t>Edit Master text styles</a:t>
             </a:r>
           </a:p>
@@ -2347,7 +2355,7 @@
           <a:p>
             <a:fld id="{8B606550-C541-449C-947B-29537B471591}" type="datetimeFigureOut">
               <a:rPr lang="en-GB" smtClean="0"/>
-              <a:t>02/03/2024</a:t>
+              <a:t>03/03/2024</a:t>
             </a:fld>
             <a:endParaRPr lang="en-GB"/>
           </a:p>
@@ -2456,7 +2464,7 @@
           <a:lstStyle/>
           <a:p>
             <a:r>
-              <a:rPr lang="en-US" smtClean="0"/>
+              <a:rPr lang="en-US"/>
               <a:t>Click to edit Master title style</a:t>
             </a:r>
             <a:endParaRPr lang="en-GB"/>
@@ -2490,35 +2498,35 @@
           <a:p>
             <a:pPr lvl="0"/>
             <a:r>
-              <a:rPr lang="en-US" smtClean="0"/>
+              <a:rPr lang="en-US"/>
               <a:t>Edit Master text styles</a:t>
             </a:r>
           </a:p>
           <a:p>
             <a:pPr lvl="1"/>
             <a:r>
-              <a:rPr lang="en-US" smtClean="0"/>
+              <a:rPr lang="en-US"/>
               <a:t>Second level</a:t>
             </a:r>
           </a:p>
           <a:p>
             <a:pPr lvl="2"/>
             <a:r>
-              <a:rPr lang="en-US" smtClean="0"/>
+              <a:rPr lang="en-US"/>
               <a:t>Third level</a:t>
             </a:r>
           </a:p>
           <a:p>
             <a:pPr lvl="3"/>
             <a:r>
-              <a:rPr lang="en-US" smtClean="0"/>
+              <a:rPr lang="en-US"/>
               <a:t>Fourth level</a:t>
             </a:r>
           </a:p>
           <a:p>
             <a:pPr lvl="4"/>
             <a:r>
-              <a:rPr lang="en-US" smtClean="0"/>
+              <a:rPr lang="en-US"/>
               <a:t>Fifth level</a:t>
             </a:r>
             <a:endParaRPr lang="en-GB"/>
@@ -2560,7 +2568,7 @@
           <a:p>
             <a:fld id="{8B606550-C541-449C-947B-29537B471591}" type="datetimeFigureOut">
               <a:rPr lang="en-GB" smtClean="0"/>
-              <a:t>02/03/2024</a:t>
+              <a:t>03/03/2024</a:t>
             </a:fld>
             <a:endParaRPr lang="en-GB"/>
           </a:p>
@@ -2981,10 +2989,9 @@
           <a:lstStyle/>
           <a:p>
             <a:r>
-              <a:rPr lang="en-GB" dirty="0" smtClean="0"/>
+              <a:rPr lang="en-GB" dirty="0"/>
               <a:t>Architecture Application</a:t>
             </a:r>
-            <a:endParaRPr lang="en-GB" dirty="0"/>
           </a:p>
         </p:txBody>
       </p:sp>
@@ -3009,10 +3016,9 @@
           <a:lstStyle/>
           <a:p>
             <a:r>
-              <a:rPr lang="en-GB" dirty="0" smtClean="0"/>
+              <a:rPr lang="en-GB" dirty="0"/>
               <a:t>Project 2  - Eric Butler</a:t>
             </a:r>
-            <a:endParaRPr lang="en-GB" dirty="0"/>
           </a:p>
         </p:txBody>
       </p:sp>
@@ -3062,10 +3068,9 @@
           <a:lstStyle/>
           <a:p>
             <a:r>
-              <a:rPr lang="en-GB" dirty="0" smtClean="0"/>
+              <a:rPr lang="en-GB" dirty="0"/>
               <a:t>Common Architecture Patterns</a:t>
             </a:r>
-            <a:endParaRPr lang="en-GB" dirty="0"/>
           </a:p>
         </p:txBody>
       </p:sp>
@@ -3085,50 +3090,33 @@
           <a:lstStyle/>
           <a:p>
             <a:r>
-              <a:rPr lang="en-GB" dirty="0" smtClean="0"/>
-              <a:t>Architecture </a:t>
-            </a:r>
-            <a:r>
               <a:rPr lang="en-GB" dirty="0"/>
-              <a:t>styles and patterns </a:t>
-            </a:r>
-            <a:r>
-              <a:rPr lang="en-GB" dirty="0" smtClean="0"/>
-              <a:t>are </a:t>
-            </a:r>
+              <a:t>Architecture styles and patterns are sets of principles that shape an application. Some include:</a:t>
+            </a:r>
+          </a:p>
+          <a:p>
             <a:r>
               <a:rPr lang="en-GB" dirty="0"/>
-              <a:t>sets of principles that shape an application</a:t>
-            </a:r>
-            <a:r>
-              <a:rPr lang="en-GB" dirty="0" smtClean="0"/>
-              <a:t>. Some include:</a:t>
-            </a:r>
-          </a:p>
-          <a:p>
-            <a:r>
-              <a:rPr lang="en-GB" dirty="0" smtClean="0"/>
               <a:t>Communication: Service Oriented Architecture (SOA), Message Bus</a:t>
             </a:r>
           </a:p>
           <a:p>
             <a:r>
-              <a:rPr lang="en-GB" dirty="0" smtClean="0"/>
+              <a:rPr lang="en-GB" dirty="0"/>
               <a:t>Deployment: Client/Server, N-Tier, 3-Tier</a:t>
             </a:r>
           </a:p>
           <a:p>
             <a:r>
-              <a:rPr lang="en-GB" dirty="0" smtClean="0"/>
+              <a:rPr lang="en-GB" dirty="0"/>
               <a:t>Domain:  Domain Driven Design</a:t>
             </a:r>
           </a:p>
           <a:p>
             <a:r>
-              <a:rPr lang="en-GB" smtClean="0"/>
+              <a:rPr lang="en-GB" dirty="0"/>
               <a:t>Structure: Component-Based, Object-Oriented, Layered Architecture</a:t>
             </a:r>
-            <a:endParaRPr lang="en-GB" dirty="0" smtClean="0"/>
           </a:p>
           <a:p>
             <a:endParaRPr lang="en-GB" dirty="0"/>
@@ -3139,6 +3127,368 @@
     <p:extLst>
       <p:ext uri="{BB962C8B-B14F-4D97-AF65-F5344CB8AC3E}">
         <p14:creationId xmlns:p14="http://schemas.microsoft.com/office/powerpoint/2010/main" val="2371616001"/>
+      </p:ext>
+    </p:extLst>
+  </p:cSld>
+  <p:clrMapOvr>
+    <a:masterClrMapping/>
+  </p:clrMapOvr>
+</p:sld>
+</file>
+
+<file path=ppt/slides/slide3.xml><?xml version="1.0" encoding="utf-8"?>
+<p:sld xmlns:a="http://schemas.openxmlformats.org/drawingml/2006/main" xmlns:r="http://schemas.openxmlformats.org/officeDocument/2006/relationships" xmlns:p="http://schemas.openxmlformats.org/presentationml/2006/main">
+  <p:cSld>
+    <p:spTree>
+      <p:nvGrpSpPr>
+        <p:cNvPr id="1" name=""/>
+        <p:cNvGrpSpPr/>
+        <p:nvPr/>
+      </p:nvGrpSpPr>
+      <p:grpSpPr>
+        <a:xfrm>
+          <a:off x="0" y="0"/>
+          <a:ext cx="0" cy="0"/>
+          <a:chOff x="0" y="0"/>
+          <a:chExt cx="0" cy="0"/>
+        </a:xfrm>
+      </p:grpSpPr>
+      <p:sp>
+        <p:nvSpPr>
+          <p:cNvPr id="2" name="Title 1">
+            <a:extLst>
+              <a:ext uri="{FF2B5EF4-FFF2-40B4-BE49-F238E27FC236}">
+                <a16:creationId xmlns:a16="http://schemas.microsoft.com/office/drawing/2014/main" id="{D7503EAB-BDC0-BC1D-0D91-3CEDD1901A70}"/>
+              </a:ext>
+            </a:extLst>
+          </p:cNvPr>
+          <p:cNvSpPr>
+            <a:spLocks noGrp="1"/>
+          </p:cNvSpPr>
+          <p:nvPr>
+            <p:ph type="title"/>
+          </p:nvPr>
+        </p:nvSpPr>
+        <p:spPr/>
+        <p:txBody>
+          <a:bodyPr/>
+          <a:lstStyle/>
+          <a:p>
+            <a:r>
+              <a:rPr lang="en-IE" dirty="0"/>
+              <a:t>Service Oriented Architecture pattern</a:t>
+            </a:r>
+          </a:p>
+        </p:txBody>
+      </p:sp>
+      <p:sp>
+        <p:nvSpPr>
+          <p:cNvPr id="3" name="Content Placeholder 2">
+            <a:extLst>
+              <a:ext uri="{FF2B5EF4-FFF2-40B4-BE49-F238E27FC236}">
+                <a16:creationId xmlns:a16="http://schemas.microsoft.com/office/drawing/2014/main" id="{BB43FDDE-FB61-9DA1-CE53-F702A1028E00}"/>
+              </a:ext>
+            </a:extLst>
+          </p:cNvPr>
+          <p:cNvSpPr>
+            <a:spLocks noGrp="1"/>
+          </p:cNvSpPr>
+          <p:nvPr>
+            <p:ph idx="1"/>
+          </p:nvPr>
+        </p:nvSpPr>
+        <p:spPr>
+          <a:xfrm>
+            <a:off x="838200" y="1556084"/>
+            <a:ext cx="10515600" cy="4936791"/>
+          </a:xfrm>
+        </p:spPr>
+        <p:txBody>
+          <a:bodyPr/>
+          <a:lstStyle/>
+          <a:p>
+            <a:r>
+              <a:rPr lang="en-IE" dirty="0"/>
+              <a:t>Software Systems where components, called services, provide functionality to other components over a network. Elements include:</a:t>
+            </a:r>
+          </a:p>
+          <a:p>
+            <a:pPr marL="0" indent="0">
+              <a:buNone/>
+            </a:pPr>
+            <a:r>
+              <a:rPr lang="en-IE" dirty="0"/>
+              <a:t>   - Services: Self-contained unites of functionality.</a:t>
+            </a:r>
+          </a:p>
+          <a:p>
+            <a:pPr marL="0" indent="0">
+              <a:buNone/>
+            </a:pPr>
+            <a:r>
+              <a:rPr lang="en-IE" dirty="0"/>
+              <a:t>   - Loose Coupling: Services are independent and communicate through defined interfaces.</a:t>
+            </a:r>
+          </a:p>
+          <a:p>
+            <a:pPr marL="0" indent="0">
+              <a:buNone/>
+            </a:pPr>
+            <a:r>
+              <a:rPr lang="en-IE" dirty="0"/>
+              <a:t>   - Service Provider: Host services. </a:t>
+            </a:r>
+          </a:p>
+          <a:p>
+            <a:pPr marL="0" indent="0">
+              <a:buNone/>
+            </a:pPr>
+            <a:r>
+              <a:rPr lang="en-IE" dirty="0"/>
+              <a:t>   - Service Consumer: Utilizes services with knowing implementation.</a:t>
+            </a:r>
+          </a:p>
+          <a:p>
+            <a:pPr marL="0" indent="0">
+              <a:buNone/>
+            </a:pPr>
+            <a:r>
+              <a:rPr lang="en-IE" dirty="0"/>
+              <a:t>   - Service Interface: Operations a service offers</a:t>
+            </a:r>
+          </a:p>
+          <a:p>
+            <a:pPr marL="0" indent="0">
+              <a:buNone/>
+            </a:pPr>
+            <a:r>
+              <a:rPr lang="en-IE" dirty="0"/>
+              <a:t>   - Interoperability: Allows different systems to communicate together</a:t>
+            </a:r>
+          </a:p>
+        </p:txBody>
+      </p:sp>
+    </p:spTree>
+    <p:extLst>
+      <p:ext uri="{BB962C8B-B14F-4D97-AF65-F5344CB8AC3E}">
+        <p14:creationId xmlns:p14="http://schemas.microsoft.com/office/powerpoint/2010/main" val="1085615834"/>
+      </p:ext>
+    </p:extLst>
+  </p:cSld>
+  <p:clrMapOvr>
+    <a:masterClrMapping/>
+  </p:clrMapOvr>
+</p:sld>
+</file>
+
+<file path=ppt/slides/slide4.xml><?xml version="1.0" encoding="utf-8"?>
+<p:sld xmlns:a="http://schemas.openxmlformats.org/drawingml/2006/main" xmlns:r="http://schemas.openxmlformats.org/officeDocument/2006/relationships" xmlns:p="http://schemas.openxmlformats.org/presentationml/2006/main">
+  <p:cSld>
+    <p:spTree>
+      <p:nvGrpSpPr>
+        <p:cNvPr id="1" name=""/>
+        <p:cNvGrpSpPr/>
+        <p:nvPr/>
+      </p:nvGrpSpPr>
+      <p:grpSpPr>
+        <a:xfrm>
+          <a:off x="0" y="0"/>
+          <a:ext cx="0" cy="0"/>
+          <a:chOff x="0" y="0"/>
+          <a:chExt cx="0" cy="0"/>
+        </a:xfrm>
+      </p:grpSpPr>
+      <p:sp>
+        <p:nvSpPr>
+          <p:cNvPr id="2" name="Title 1">
+            <a:extLst>
+              <a:ext uri="{FF2B5EF4-FFF2-40B4-BE49-F238E27FC236}">
+                <a16:creationId xmlns:a16="http://schemas.microsoft.com/office/drawing/2014/main" id="{067307C8-1EC5-8392-3DBC-3A8F043AC414}"/>
+              </a:ext>
+            </a:extLst>
+          </p:cNvPr>
+          <p:cNvSpPr>
+            <a:spLocks noGrp="1"/>
+          </p:cNvSpPr>
+          <p:nvPr>
+            <p:ph type="title"/>
+          </p:nvPr>
+        </p:nvSpPr>
+        <p:spPr/>
+        <p:txBody>
+          <a:bodyPr/>
+          <a:lstStyle/>
+          <a:p>
+            <a:r>
+              <a:rPr lang="en-US" dirty="0"/>
+              <a:t>Message Bus</a:t>
+            </a:r>
+            <a:endParaRPr lang="en-IE" dirty="0"/>
+          </a:p>
+        </p:txBody>
+      </p:sp>
+      <p:sp>
+        <p:nvSpPr>
+          <p:cNvPr id="3" name="Content Placeholder 2">
+            <a:extLst>
+              <a:ext uri="{FF2B5EF4-FFF2-40B4-BE49-F238E27FC236}">
+                <a16:creationId xmlns:a16="http://schemas.microsoft.com/office/drawing/2014/main" id="{4FBD46A0-6DDE-2485-A44A-D0D1422C87C4}"/>
+              </a:ext>
+            </a:extLst>
+          </p:cNvPr>
+          <p:cNvSpPr>
+            <a:spLocks noGrp="1"/>
+          </p:cNvSpPr>
+          <p:nvPr>
+            <p:ph idx="1"/>
+          </p:nvPr>
+        </p:nvSpPr>
+        <p:spPr>
+          <a:xfrm>
+            <a:off x="838200" y="1825625"/>
+            <a:ext cx="10515600" cy="4667250"/>
+          </a:xfrm>
+        </p:spPr>
+        <p:txBody>
+          <a:bodyPr>
+            <a:normAutofit lnSpcReduction="10000"/>
+          </a:bodyPr>
+          <a:lstStyle/>
+          <a:p>
+            <a:r>
+              <a:rPr lang="en-US" dirty="0"/>
+              <a:t>Message bus serves as a communication infrastructure within a software system.</a:t>
+            </a:r>
+          </a:p>
+          <a:p>
+            <a:r>
+              <a:rPr lang="en-US" dirty="0"/>
+              <a:t>Allows components to communicate without direct dependencies.</a:t>
+            </a:r>
+          </a:p>
+          <a:p>
+            <a:r>
+              <a:rPr lang="en-IE" dirty="0"/>
+              <a:t>Routes messages from producers to consumers based on rules.</a:t>
+            </a:r>
+          </a:p>
+          <a:p>
+            <a:r>
+              <a:rPr lang="en-IE" dirty="0"/>
+              <a:t>Facilitates scalable architectures by handling message distribution efficiently.</a:t>
+            </a:r>
+          </a:p>
+          <a:p>
+            <a:r>
+              <a:rPr lang="en-IE" dirty="0"/>
+              <a:t>Ensures reliable message delivery through built in systems like persistence.</a:t>
+            </a:r>
+          </a:p>
+          <a:p>
+            <a:r>
+              <a:rPr lang="en-IE" dirty="0"/>
+              <a:t>Enables common communication platforms for systems.</a:t>
+            </a:r>
+          </a:p>
+          <a:p>
+            <a:r>
+              <a:rPr lang="en-IE" dirty="0"/>
+              <a:t>Supports communication patterns that allow systems to operate independently.</a:t>
+            </a:r>
+          </a:p>
+          <a:p>
+            <a:endParaRPr lang="en-IE" dirty="0"/>
+          </a:p>
+        </p:txBody>
+      </p:sp>
+    </p:spTree>
+    <p:extLst>
+      <p:ext uri="{BB962C8B-B14F-4D97-AF65-F5344CB8AC3E}">
+        <p14:creationId xmlns:p14="http://schemas.microsoft.com/office/powerpoint/2010/main" val="1882628539"/>
+      </p:ext>
+    </p:extLst>
+  </p:cSld>
+  <p:clrMapOvr>
+    <a:masterClrMapping/>
+  </p:clrMapOvr>
+</p:sld>
+</file>
+
+<file path=ppt/slides/slide5.xml><?xml version="1.0" encoding="utf-8"?>
+<p:sld xmlns:a="http://schemas.openxmlformats.org/drawingml/2006/main" xmlns:r="http://schemas.openxmlformats.org/officeDocument/2006/relationships" xmlns:p="http://schemas.openxmlformats.org/presentationml/2006/main">
+  <p:cSld>
+    <p:spTree>
+      <p:nvGrpSpPr>
+        <p:cNvPr id="1" name=""/>
+        <p:cNvGrpSpPr/>
+        <p:nvPr/>
+      </p:nvGrpSpPr>
+      <p:grpSpPr>
+        <a:xfrm>
+          <a:off x="0" y="0"/>
+          <a:ext cx="0" cy="0"/>
+          <a:chOff x="0" y="0"/>
+          <a:chExt cx="0" cy="0"/>
+        </a:xfrm>
+      </p:grpSpPr>
+      <p:sp>
+        <p:nvSpPr>
+          <p:cNvPr id="2" name="Title 1">
+            <a:extLst>
+              <a:ext uri="{FF2B5EF4-FFF2-40B4-BE49-F238E27FC236}">
+                <a16:creationId xmlns:a16="http://schemas.microsoft.com/office/drawing/2014/main" id="{C5AAD900-9198-7F2B-1CD6-28D4CDE50AEC}"/>
+              </a:ext>
+            </a:extLst>
+          </p:cNvPr>
+          <p:cNvSpPr>
+            <a:spLocks noGrp="1"/>
+          </p:cNvSpPr>
+          <p:nvPr>
+            <p:ph type="title"/>
+          </p:nvPr>
+        </p:nvSpPr>
+        <p:spPr/>
+        <p:txBody>
+          <a:bodyPr/>
+          <a:lstStyle/>
+          <a:p>
+            <a:r>
+              <a:rPr lang="en-US" dirty="0"/>
+              <a:t>Client / Server</a:t>
+            </a:r>
+            <a:endParaRPr lang="en-IE" dirty="0"/>
+          </a:p>
+        </p:txBody>
+      </p:sp>
+      <p:sp>
+        <p:nvSpPr>
+          <p:cNvPr id="3" name="Content Placeholder 2">
+            <a:extLst>
+              <a:ext uri="{FF2B5EF4-FFF2-40B4-BE49-F238E27FC236}">
+                <a16:creationId xmlns:a16="http://schemas.microsoft.com/office/drawing/2014/main" id="{6280F063-243F-D766-806A-6E2FB982CBEB}"/>
+              </a:ext>
+            </a:extLst>
+          </p:cNvPr>
+          <p:cNvSpPr>
+            <a:spLocks noGrp="1"/>
+          </p:cNvSpPr>
+          <p:nvPr>
+            <p:ph idx="1"/>
+          </p:nvPr>
+        </p:nvSpPr>
+        <p:spPr/>
+        <p:txBody>
+          <a:bodyPr/>
+          <a:lstStyle/>
+          <a:p>
+            <a:endParaRPr lang="en-IE"/>
+          </a:p>
+        </p:txBody>
+      </p:sp>
+    </p:spTree>
+    <p:extLst>
+      <p:ext uri="{BB962C8B-B14F-4D97-AF65-F5344CB8AC3E}">
+        <p14:creationId xmlns:p14="http://schemas.microsoft.com/office/powerpoint/2010/main" val="2899197653"/>
       </p:ext>
     </p:extLst>
   </p:cSld>

</xml_diff>